<commit_message>
apresentação e atualizações das pastas
</commit_message>
<xml_diff>
--- a/Documentação/PPT/FastTech - Sprint 2.pptx
+++ b/Documentação/PPT/FastTech - Sprint 2.pptx
@@ -12,12 +12,12 @@
     <p:sldId id="260" r:id="rId6"/>
     <p:sldId id="261" r:id="rId7"/>
     <p:sldId id="262" r:id="rId8"/>
-    <p:sldId id="263" r:id="rId9"/>
-    <p:sldId id="264" r:id="rId10"/>
-    <p:sldId id="265" r:id="rId11"/>
-    <p:sldId id="266" r:id="rId12"/>
-    <p:sldId id="267" r:id="rId13"/>
-    <p:sldId id="268" r:id="rId14"/>
+    <p:sldId id="269" r:id="rId9"/>
+    <p:sldId id="263" r:id="rId10"/>
+    <p:sldId id="264" r:id="rId11"/>
+    <p:sldId id="265" r:id="rId12"/>
+    <p:sldId id="266" r:id="rId13"/>
+    <p:sldId id="267" r:id="rId14"/>
   </p:sldIdLst>
   <p:sldSz cx="18288000" cy="10287000"/>
   <p:notesSz cx="6858000" cy="9144000"/>
@@ -47,17 +47,6 @@
     <p:embeddedFont>
       <p:font typeface="Nunito Sans Bold" panose="020B0604020202020204" charset="0"/>
       <p:regular r:id="rId25"/>
-    </p:embeddedFont>
-    <p:embeddedFont>
-      <p:font typeface="Open Sans" panose="020B0606030504020204" pitchFamily="34" charset="0"/>
-      <p:regular r:id="rId26"/>
-      <p:bold r:id="rId27"/>
-      <p:italic r:id="rId28"/>
-      <p:boldItalic r:id="rId29"/>
-    </p:embeddedFont>
-    <p:embeddedFont>
-      <p:font typeface="Open Sans Extra Bold" panose="020B0604020202020204" charset="0"/>
-      <p:regular r:id="rId30"/>
     </p:embeddedFont>
   </p:embeddedFontLst>
   <p:defaultTextStyle>
@@ -354,7 +343,7 @@
             <a:fld id="{1D8BD707-D9CF-40AE-B4C6-C98DA3205C09}" type="datetimeFigureOut">
               <a:rPr lang="en-US" smtClean="0"/>
               <a:pPr/>
-              <a:t>10/19/2021</a:t>
+              <a:t>10/20/2021</a:t>
             </a:fld>
             <a:endParaRPr lang="en-US"/>
           </a:p>
@@ -519,7 +508,7 @@
             <a:fld id="{1D8BD707-D9CF-40AE-B4C6-C98DA3205C09}" type="datetimeFigureOut">
               <a:rPr lang="en-US" smtClean="0"/>
               <a:pPr/>
-              <a:t>10/19/2021</a:t>
+              <a:t>10/20/2021</a:t>
             </a:fld>
             <a:endParaRPr lang="en-US"/>
           </a:p>
@@ -694,7 +683,7 @@
             <a:fld id="{1D8BD707-D9CF-40AE-B4C6-C98DA3205C09}" type="datetimeFigureOut">
               <a:rPr lang="en-US" smtClean="0"/>
               <a:pPr/>
-              <a:t>10/19/2021</a:t>
+              <a:t>10/20/2021</a:t>
             </a:fld>
             <a:endParaRPr lang="en-US"/>
           </a:p>
@@ -859,7 +848,7 @@
             <a:fld id="{1D8BD707-D9CF-40AE-B4C6-C98DA3205C09}" type="datetimeFigureOut">
               <a:rPr lang="en-US" smtClean="0"/>
               <a:pPr/>
-              <a:t>10/19/2021</a:t>
+              <a:t>10/20/2021</a:t>
             </a:fld>
             <a:endParaRPr lang="en-US"/>
           </a:p>
@@ -1101,7 +1090,7 @@
             <a:fld id="{1D8BD707-D9CF-40AE-B4C6-C98DA3205C09}" type="datetimeFigureOut">
               <a:rPr lang="en-US" smtClean="0"/>
               <a:pPr/>
-              <a:t>10/19/2021</a:t>
+              <a:t>10/20/2021</a:t>
             </a:fld>
             <a:endParaRPr lang="en-US"/>
           </a:p>
@@ -1383,7 +1372,7 @@
             <a:fld id="{1D8BD707-D9CF-40AE-B4C6-C98DA3205C09}" type="datetimeFigureOut">
               <a:rPr lang="en-US" smtClean="0"/>
               <a:pPr/>
-              <a:t>10/19/2021</a:t>
+              <a:t>10/20/2021</a:t>
             </a:fld>
             <a:endParaRPr lang="en-US"/>
           </a:p>
@@ -1799,7 +1788,7 @@
             <a:fld id="{1D8BD707-D9CF-40AE-B4C6-C98DA3205C09}" type="datetimeFigureOut">
               <a:rPr lang="en-US" smtClean="0"/>
               <a:pPr/>
-              <a:t>10/19/2021</a:t>
+              <a:t>10/20/2021</a:t>
             </a:fld>
             <a:endParaRPr lang="en-US"/>
           </a:p>
@@ -1913,7 +1902,7 @@
             <a:fld id="{1D8BD707-D9CF-40AE-B4C6-C98DA3205C09}" type="datetimeFigureOut">
               <a:rPr lang="en-US" smtClean="0"/>
               <a:pPr/>
-              <a:t>10/19/2021</a:t>
+              <a:t>10/20/2021</a:t>
             </a:fld>
             <a:endParaRPr lang="en-US"/>
           </a:p>
@@ -2005,7 +1994,7 @@
             <a:fld id="{1D8BD707-D9CF-40AE-B4C6-C98DA3205C09}" type="datetimeFigureOut">
               <a:rPr lang="en-US" smtClean="0"/>
               <a:pPr/>
-              <a:t>10/19/2021</a:t>
+              <a:t>10/20/2021</a:t>
             </a:fld>
             <a:endParaRPr lang="en-US"/>
           </a:p>
@@ -2277,7 +2266,7 @@
             <a:fld id="{1D8BD707-D9CF-40AE-B4C6-C98DA3205C09}" type="datetimeFigureOut">
               <a:rPr lang="en-US" smtClean="0"/>
               <a:pPr/>
-              <a:t>10/19/2021</a:t>
+              <a:t>10/20/2021</a:t>
             </a:fld>
             <a:endParaRPr lang="en-US"/>
           </a:p>
@@ -2526,7 +2515,7 @@
             <a:fld id="{1D8BD707-D9CF-40AE-B4C6-C98DA3205C09}" type="datetimeFigureOut">
               <a:rPr lang="en-US" smtClean="0"/>
               <a:pPr/>
-              <a:t>10/19/2021</a:t>
+              <a:t>10/20/2021</a:t>
             </a:fld>
             <a:endParaRPr lang="en-US"/>
           </a:p>
@@ -2734,7 +2723,7 @@
             <a:fld id="{1D8BD707-D9CF-40AE-B4C6-C98DA3205C09}" type="datetimeFigureOut">
               <a:rPr lang="en-US" smtClean="0"/>
               <a:pPr/>
-              <a:t>10/19/2021</a:t>
+              <a:t>10/20/2021</a:t>
             </a:fld>
             <a:endParaRPr lang="en-US"/>
           </a:p>
@@ -3393,6 +3382,293 @@
         </p:nvSpPr>
         <p:spPr>
           <a:xfrm>
+            <a:off x="1028700" y="1690626"/>
+            <a:ext cx="10981377" cy="2945425"/>
+          </a:xfrm>
+          <a:prstGeom prst="rect">
+            <a:avLst/>
+          </a:prstGeom>
+        </p:spPr>
+        <p:txBody>
+          <a:bodyPr lIns="0" tIns="0" rIns="0" bIns="0" rtlCol="0" anchor="t">
+            <a:spAutoFit/>
+          </a:bodyPr>
+          <a:lstStyle/>
+          <a:p>
+            <a:pPr>
+              <a:lnSpc>
+                <a:spcPts val="11465"/>
+              </a:lnSpc>
+            </a:pPr>
+            <a:r>
+              <a:rPr lang="en-US" sz="10423" spc="-104">
+                <a:solidFill>
+                  <a:srgbClr val="3884FD"/>
+                </a:solidFill>
+                <a:latin typeface="Nunito Bold"/>
+              </a:rPr>
+              <a:t>Dashboard Estático</a:t>
+            </a:r>
+          </a:p>
+        </p:txBody>
+      </p:sp>
+      <p:grpSp>
+        <p:nvGrpSpPr>
+          <p:cNvPr id="3" name="Group 3"/>
+          <p:cNvGrpSpPr/>
+          <p:nvPr/>
+        </p:nvGrpSpPr>
+        <p:grpSpPr>
+          <a:xfrm>
+            <a:off x="8003817" y="4400854"/>
+            <a:ext cx="9217866" cy="4334932"/>
+            <a:chOff x="0" y="0"/>
+            <a:chExt cx="12290487" cy="5779909"/>
+          </a:xfrm>
+        </p:grpSpPr>
+        <p:pic>
+          <p:nvPicPr>
+            <p:cNvPr id="4" name="Picture 4"/>
+            <p:cNvPicPr>
+              <a:picLocks noChangeAspect="1"/>
+            </p:cNvPicPr>
+            <p:nvPr/>
+          </p:nvPicPr>
+          <p:blipFill>
+            <a:blip r:embed="rId2">
+              <a:extLst>
+                <a:ext uri="{28A0092B-C50C-407E-A947-70E740481C1C}">
+                  <a14:useLocalDpi xmlns:a14="http://schemas.microsoft.com/office/drawing/2010/main" val="0"/>
+                </a:ext>
+                <a:ext uri="{96DAC541-7B7A-43D3-8B79-37D633B846F1}">
+                  <asvg:svgBlip xmlns:asvg="http://schemas.microsoft.com/office/drawing/2016/SVG/main" r:embed="rId3"/>
+                </a:ext>
+              </a:extLst>
+            </a:blip>
+            <a:srcRect/>
+            <a:stretch>
+              <a:fillRect/>
+            </a:stretch>
+          </p:blipFill>
+          <p:spPr>
+            <a:xfrm>
+              <a:off x="598023" y="0"/>
+              <a:ext cx="5601257" cy="5779909"/>
+            </a:xfrm>
+            <a:prstGeom prst="rect">
+              <a:avLst/>
+            </a:prstGeom>
+          </p:spPr>
+        </p:pic>
+        <p:pic>
+          <p:nvPicPr>
+            <p:cNvPr id="5" name="Picture 5"/>
+            <p:cNvPicPr>
+              <a:picLocks noChangeAspect="1"/>
+            </p:cNvPicPr>
+            <p:nvPr/>
+          </p:nvPicPr>
+          <p:blipFill>
+            <a:blip r:embed="rId4">
+              <a:extLst>
+                <a:ext uri="{28A0092B-C50C-407E-A947-70E740481C1C}">
+                  <a14:useLocalDpi xmlns:a14="http://schemas.microsoft.com/office/drawing/2010/main" val="0"/>
+                </a:ext>
+                <a:ext uri="{96DAC541-7B7A-43D3-8B79-37D633B846F1}">
+                  <asvg:svgBlip xmlns:asvg="http://schemas.microsoft.com/office/drawing/2016/SVG/main" r:embed="rId5"/>
+                </a:ext>
+              </a:extLst>
+            </a:blip>
+            <a:srcRect/>
+            <a:stretch>
+              <a:fillRect/>
+            </a:stretch>
+          </p:blipFill>
+          <p:spPr>
+            <a:xfrm>
+              <a:off x="4661039" y="1594934"/>
+              <a:ext cx="5627716" cy="4184975"/>
+            </a:xfrm>
+            <a:prstGeom prst="rect">
+              <a:avLst/>
+            </a:prstGeom>
+          </p:spPr>
+        </p:pic>
+        <p:sp>
+          <p:nvSpPr>
+            <p:cNvPr id="6" name="AutoShape 6"/>
+            <p:cNvSpPr/>
+            <p:nvPr/>
+          </p:nvSpPr>
+          <p:spPr>
+            <a:xfrm>
+              <a:off x="0" y="5741346"/>
+              <a:ext cx="12290487" cy="0"/>
+            </a:xfrm>
+            <a:prstGeom prst="line">
+              <a:avLst/>
+            </a:prstGeom>
+            <a:ln w="30850" cap="rnd">
+              <a:solidFill>
+                <a:srgbClr val="243762"/>
+              </a:solidFill>
+              <a:prstDash val="solid"/>
+              <a:headEnd type="none" w="sm" len="sm"/>
+              <a:tailEnd type="none" w="sm" len="sm"/>
+            </a:ln>
+          </p:spPr>
+        </p:sp>
+      </p:grpSp>
+      <p:sp>
+        <p:nvSpPr>
+          <p:cNvPr id="9" name="TextBox 9"/>
+          <p:cNvSpPr txBox="1"/>
+          <p:nvPr/>
+        </p:nvSpPr>
+        <p:spPr>
+          <a:xfrm>
+            <a:off x="15106427" y="1321448"/>
+            <a:ext cx="2597624" cy="167879"/>
+          </a:xfrm>
+          <a:prstGeom prst="rect">
+            <a:avLst/>
+          </a:prstGeom>
+        </p:spPr>
+        <p:txBody>
+          <a:bodyPr lIns="0" tIns="0" rIns="0" bIns="0" rtlCol="0" anchor="t">
+            <a:spAutoFit/>
+          </a:bodyPr>
+          <a:lstStyle/>
+          <a:p>
+            <a:pPr>
+              <a:lnSpc>
+                <a:spcPts val="1439"/>
+              </a:lnSpc>
+            </a:pPr>
+            <a:endParaRPr/>
+          </a:p>
+        </p:txBody>
+      </p:sp>
+      <p:pic>
+        <p:nvPicPr>
+          <p:cNvPr id="11" name="Picture 3">
+            <a:extLst>
+              <a:ext uri="{FF2B5EF4-FFF2-40B4-BE49-F238E27FC236}">
+                <a16:creationId xmlns:a16="http://schemas.microsoft.com/office/drawing/2014/main" id="{E62888E2-3A12-4624-8771-B34467BB82DE}"/>
+              </a:ext>
+            </a:extLst>
+          </p:cNvPr>
+          <p:cNvPicPr>
+            <a:picLocks noChangeAspect="1"/>
+          </p:cNvPicPr>
+          <p:nvPr/>
+        </p:nvPicPr>
+        <p:blipFill>
+          <a:blip r:embed="rId6"/>
+          <a:srcRect/>
+          <a:stretch>
+            <a:fillRect/>
+          </a:stretch>
+        </p:blipFill>
+        <p:spPr>
+          <a:xfrm>
+            <a:off x="14115047" y="369727"/>
+            <a:ext cx="825172" cy="821093"/>
+          </a:xfrm>
+          <a:prstGeom prst="rect">
+            <a:avLst/>
+          </a:prstGeom>
+        </p:spPr>
+      </p:pic>
+      <p:sp>
+        <p:nvSpPr>
+          <p:cNvPr id="12" name="TextBox 6">
+            <a:extLst>
+              <a:ext uri="{FF2B5EF4-FFF2-40B4-BE49-F238E27FC236}">
+                <a16:creationId xmlns:a16="http://schemas.microsoft.com/office/drawing/2014/main" id="{35BCBEB1-0228-406B-BAF5-5B5C0A037371}"/>
+              </a:ext>
+            </a:extLst>
+          </p:cNvPr>
+          <p:cNvSpPr txBox="1"/>
+          <p:nvPr/>
+        </p:nvSpPr>
+        <p:spPr>
+          <a:xfrm>
+            <a:off x="15106427" y="592260"/>
+            <a:ext cx="2597624" cy="623026"/>
+          </a:xfrm>
+          <a:prstGeom prst="rect">
+            <a:avLst/>
+          </a:prstGeom>
+        </p:spPr>
+        <p:txBody>
+          <a:bodyPr lIns="0" tIns="0" rIns="0" bIns="0" rtlCol="0" anchor="t">
+            <a:spAutoFit/>
+          </a:bodyPr>
+          <a:lstStyle/>
+          <a:p>
+            <a:pPr>
+              <a:lnSpc>
+                <a:spcPts val="4737"/>
+              </a:lnSpc>
+            </a:pPr>
+            <a:r>
+              <a:rPr lang="en-US" sz="4307" spc="-43" dirty="0">
+                <a:solidFill>
+                  <a:srgbClr val="5879FA"/>
+                </a:solidFill>
+                <a:latin typeface="Nunito Bold"/>
+              </a:rPr>
+              <a:t>FastTech</a:t>
+            </a:r>
+          </a:p>
+        </p:txBody>
+      </p:sp>
+    </p:spTree>
+  </p:cSld>
+  <p:clrMapOvr>
+    <a:masterClrMapping/>
+  </p:clrMapOvr>
+  <mc:AlternateContent xmlns:mc="http://schemas.openxmlformats.org/markup-compatibility/2006" xmlns:p159="http://schemas.microsoft.com/office/powerpoint/2015/09/main">
+    <mc:Choice Requires="p159">
+      <p:transition xmlns:p14="http://schemas.microsoft.com/office/powerpoint/2010/main" spd="slow" p14:dur="2000">
+        <p159:morph option="byObject"/>
+      </p:transition>
+    </mc:Choice>
+    <mc:Fallback xmlns="">
+      <p:transition spd="slow">
+        <p:fade/>
+      </p:transition>
+    </mc:Fallback>
+  </mc:AlternateContent>
+</p:sld>
+</file>
+
+<file path=ppt/slides/slide11.xml><?xml version="1.0" encoding="utf-8"?>
+<p:sld xmlns:a="http://schemas.openxmlformats.org/drawingml/2006/main" xmlns:r="http://schemas.openxmlformats.org/officeDocument/2006/relationships" xmlns:p="http://schemas.openxmlformats.org/presentationml/2006/main">
+  <p:cSld>
+    <p:spTree>
+      <p:nvGrpSpPr>
+        <p:cNvPr id="1" name=""/>
+        <p:cNvGrpSpPr/>
+        <p:nvPr/>
+      </p:nvGrpSpPr>
+      <p:grpSpPr>
+        <a:xfrm>
+          <a:off x="0" y="0"/>
+          <a:ext cx="0" cy="0"/>
+          <a:chOff x="0" y="0"/>
+          <a:chExt cx="0" cy="0"/>
+        </a:xfrm>
+      </p:grpSpPr>
+      <p:sp>
+        <p:nvSpPr>
+          <p:cNvPr id="2" name="TextBox 2"/>
+          <p:cNvSpPr txBox="1"/>
+          <p:nvPr/>
+        </p:nvSpPr>
+        <p:spPr>
+          <a:xfrm>
             <a:off x="0" y="1095375"/>
             <a:ext cx="11292686" cy="1152525"/>
           </a:xfrm>
@@ -3566,7 +3842,7 @@
 </p:sld>
 </file>
 
-<file path=ppt/slides/slide11.xml><?xml version="1.0" encoding="utf-8"?>
+<file path=ppt/slides/slide12.xml><?xml version="1.0" encoding="utf-8"?>
 <p:sld xmlns:a="http://schemas.openxmlformats.org/drawingml/2006/main" xmlns:r="http://schemas.openxmlformats.org/officeDocument/2006/relationships" xmlns:p="http://schemas.openxmlformats.org/presentationml/2006/main">
   <p:cSld>
     <p:spTree>
@@ -4290,7 +4566,7 @@
 </p:sld>
 </file>
 
-<file path=ppt/slides/slide12.xml><?xml version="1.0" encoding="utf-8"?>
+<file path=ppt/slides/slide13.xml><?xml version="1.0" encoding="utf-8"?>
 <p:sld xmlns:a="http://schemas.openxmlformats.org/drawingml/2006/main" xmlns:r="http://schemas.openxmlformats.org/officeDocument/2006/relationships" xmlns:p="http://schemas.openxmlformats.org/presentationml/2006/main">
   <p:cSld>
     <p:spTree>
@@ -4569,7 +4845,7 @@
         </p:blipFill>
         <p:spPr>
           <a:xfrm>
-            <a:off x="12403159" y="6045618"/>
+            <a:off x="10401996" y="6028542"/>
             <a:ext cx="2719620" cy="937401"/>
           </a:xfrm>
           <a:prstGeom prst="rect">
@@ -4624,7 +4900,7 @@
         <p:spPr>
           <a:xfrm>
             <a:off x="10992686" y="9234596"/>
-            <a:ext cx="6208857" cy="540571"/>
+            <a:ext cx="6208857" cy="555921"/>
           </a:xfrm>
           <a:prstGeom prst="rect">
             <a:avLst/>
@@ -4645,22 +4921,10 @@
               </a:spcBef>
             </a:pPr>
             <a:r>
-              <a:rPr lang="en-US" sz="3199" dirty="0">
-                <a:solidFill>
-                  <a:srgbClr val="243762"/>
-                </a:solidFill>
+              <a:rPr lang="en-US" sz="3200" b="1" dirty="0">
                 <a:latin typeface="Nunito"/>
               </a:rPr>
-              <a:t>procrastinator</a:t>
-            </a:r>
-            <a:r>
-              <a:rPr lang="en-US" sz="3200" dirty="0">
-                <a:solidFill>
-                  <a:srgbClr val="243762"/>
-                </a:solidFill>
-                <a:latin typeface="Nunito"/>
-              </a:rPr>
-              <a:t>@fasttech.com.br</a:t>
+              <a:t>tfast5234@gmail.com</a:t>
             </a:r>
           </a:p>
         </p:txBody>
@@ -4770,6 +5034,53 @@
           </a:prstGeom>
         </p:spPr>
       </p:pic>
+      <p:pic>
+        <p:nvPicPr>
+          <p:cNvPr id="1026" name="Picture 2" descr="Stack Overflow está migrando para .NET Core | by Marcelo Cabral Ghilardi |  Medium">
+            <a:extLst>
+              <a:ext uri="{FF2B5EF4-FFF2-40B4-BE49-F238E27FC236}">
+                <a16:creationId xmlns:a16="http://schemas.microsoft.com/office/drawing/2014/main" id="{84A5935B-2776-47AB-BBC0-FF5623460149}"/>
+              </a:ext>
+            </a:extLst>
+          </p:cNvPr>
+          <p:cNvPicPr>
+            <a:picLocks noChangeAspect="1" noChangeArrowheads="1"/>
+          </p:cNvPicPr>
+          <p:nvPr/>
+        </p:nvPicPr>
+        <p:blipFill>
+          <a:blip r:embed="rId12" cstate="print">
+            <a:extLst>
+              <a:ext uri="{28A0092B-C50C-407E-A947-70E740481C1C}">
+                <a14:useLocalDpi xmlns:a14="http://schemas.microsoft.com/office/drawing/2010/main" val="0"/>
+              </a:ext>
+            </a:extLst>
+          </a:blip>
+          <a:srcRect/>
+          <a:stretch>
+            <a:fillRect/>
+          </a:stretch>
+        </p:blipFill>
+        <p:spPr bwMode="auto">
+          <a:xfrm>
+            <a:off x="13850184" y="5733331"/>
+            <a:ext cx="3184186" cy="1247140"/>
+          </a:xfrm>
+          <a:prstGeom prst="rect">
+            <a:avLst/>
+          </a:prstGeom>
+          <a:noFill/>
+          <a:extLst>
+            <a:ext uri="{909E8E84-426E-40DD-AFC4-6F175D3DCCD1}">
+              <a14:hiddenFill xmlns:a14="http://schemas.microsoft.com/office/drawing/2010/main">
+                <a:solidFill>
+                  <a:srgbClr val="FFFFFF"/>
+                </a:solidFill>
+              </a14:hiddenFill>
+            </a:ext>
+          </a:extLst>
+        </p:spPr>
+      </p:pic>
     </p:spTree>
   </p:cSld>
   <p:clrMapOvr>
@@ -4778,163 +5089,6 @@
   <p:transition spd="slow">
     <p:randomBar dir="vert"/>
   </p:transition>
-</p:sld>
-</file>
-
-<file path=ppt/slides/slide13.xml><?xml version="1.0" encoding="utf-8"?>
-<p:sld xmlns:a="http://schemas.openxmlformats.org/drawingml/2006/main" xmlns:r="http://schemas.openxmlformats.org/officeDocument/2006/relationships" xmlns:p="http://schemas.openxmlformats.org/presentationml/2006/main">
-  <p:cSld>
-    <p:spTree>
-      <p:nvGrpSpPr>
-        <p:cNvPr id="1" name=""/>
-        <p:cNvGrpSpPr/>
-        <p:nvPr/>
-      </p:nvGrpSpPr>
-      <p:grpSpPr>
-        <a:xfrm>
-          <a:off x="0" y="0"/>
-          <a:ext cx="0" cy="0"/>
-          <a:chOff x="0" y="0"/>
-          <a:chExt cx="0" cy="0"/>
-        </a:xfrm>
-      </p:grpSpPr>
-      <p:sp>
-        <p:nvSpPr>
-          <p:cNvPr id="2" name="TextBox 2"/>
-          <p:cNvSpPr txBox="1"/>
-          <p:nvPr/>
-        </p:nvSpPr>
-        <p:spPr>
-          <a:xfrm>
-            <a:off x="3962833" y="952500"/>
-            <a:ext cx="10362334" cy="1455420"/>
-          </a:xfrm>
-          <a:prstGeom prst="rect">
-            <a:avLst/>
-          </a:prstGeom>
-        </p:spPr>
-        <p:txBody>
-          <a:bodyPr lIns="0" tIns="0" rIns="0" bIns="0" rtlCol="0" anchor="t">
-            <a:spAutoFit/>
-          </a:bodyPr>
-          <a:lstStyle/>
-          <a:p>
-            <a:pPr algn="ctr">
-              <a:lnSpc>
-                <a:spcPts val="5880"/>
-              </a:lnSpc>
-            </a:pPr>
-            <a:r>
-              <a:rPr lang="en-US" sz="4200">
-                <a:solidFill>
-                  <a:srgbClr val="000000"/>
-                </a:solidFill>
-                <a:latin typeface="Open Sans Extra Bold"/>
-              </a:rPr>
-              <a:t>Tópicos que não estão mas na apresentação irão ser  falados</a:t>
-            </a:r>
-          </a:p>
-        </p:txBody>
-      </p:sp>
-      <p:sp>
-        <p:nvSpPr>
-          <p:cNvPr id="3" name="TextBox 3"/>
-          <p:cNvSpPr txBox="1"/>
-          <p:nvPr/>
-        </p:nvSpPr>
-        <p:spPr>
-          <a:xfrm>
-            <a:off x="1352054" y="3708342"/>
-            <a:ext cx="15156459" cy="2515235"/>
-          </a:xfrm>
-          <a:prstGeom prst="rect">
-            <a:avLst/>
-          </a:prstGeom>
-        </p:spPr>
-        <p:txBody>
-          <a:bodyPr lIns="0" tIns="0" rIns="0" bIns="0" rtlCol="0" anchor="t">
-            <a:spAutoFit/>
-          </a:bodyPr>
-          <a:lstStyle/>
-          <a:p>
-            <a:pPr marL="777240" lvl="1" indent="-388620" algn="ctr">
-              <a:lnSpc>
-                <a:spcPts val="5040"/>
-              </a:lnSpc>
-              <a:buFont typeface="Arial"/>
-              <a:buChar char="•"/>
-            </a:pPr>
-            <a:r>
-              <a:rPr lang="en-US" sz="3600">
-                <a:solidFill>
-                  <a:srgbClr val="000000"/>
-                </a:solidFill>
-                <a:latin typeface="Open Sans"/>
-              </a:rPr>
-              <a:t>Jar Inicial – Console conectado no Banco</a:t>
-            </a:r>
-          </a:p>
-          <a:p>
-            <a:pPr marL="777240" lvl="1" indent="-388620" algn="ctr">
-              <a:lnSpc>
-                <a:spcPts val="5040"/>
-              </a:lnSpc>
-              <a:buFont typeface="Arial"/>
-              <a:buChar char="•"/>
-            </a:pPr>
-            <a:r>
-              <a:rPr lang="en-US" sz="3600">
-                <a:solidFill>
-                  <a:srgbClr val="000000"/>
-                </a:solidFill>
-                <a:latin typeface="Open Sans"/>
-              </a:rPr>
-              <a:t>USO da API: Listar Processos, CPU, Memória, Disco</a:t>
-            </a:r>
-          </a:p>
-          <a:p>
-            <a:pPr marL="777240" lvl="1" indent="-388620" algn="ctr">
-              <a:lnSpc>
-                <a:spcPts val="5040"/>
-              </a:lnSpc>
-              <a:buFont typeface="Arial"/>
-              <a:buChar char="•"/>
-            </a:pPr>
-            <a:r>
-              <a:rPr lang="en-US" sz="3600">
-                <a:solidFill>
-                  <a:srgbClr val="000000"/>
-                </a:solidFill>
-                <a:latin typeface="Open Sans"/>
-              </a:rPr>
-              <a:t>USO da API : Listar Info Hardware</a:t>
-            </a:r>
-          </a:p>
-          <a:p>
-            <a:pPr marL="777240" lvl="1" indent="-388620" algn="ctr">
-              <a:lnSpc>
-                <a:spcPts val="5040"/>
-              </a:lnSpc>
-              <a:buFont typeface="Arial"/>
-              <a:buChar char="•"/>
-            </a:pPr>
-            <a:r>
-              <a:rPr lang="en-US" sz="3600">
-                <a:solidFill>
-                  <a:srgbClr val="000000"/>
-                </a:solidFill>
-                <a:latin typeface="Open Sans"/>
-              </a:rPr>
-              <a:t>JAR inicial rodando em Cliente Linux em VM: Sistemas Op - DESAFIO</a:t>
-            </a:r>
-          </a:p>
-        </p:txBody>
-      </p:sp>
-    </p:spTree>
-  </p:cSld>
-  <p:clrMapOvr>
-    <a:masterClrMapping/>
-  </p:clrMapOvr>
 </p:sld>
 </file>
 
@@ -6194,25 +6348,7 @@
                 </a:solidFill>
                 <a:latin typeface="Nunito Bold"/>
               </a:rPr>
-              <a:t>Diagrama de </a:t>
-            </a:r>
-            <a:r>
-              <a:rPr lang="en-US" sz="7921" spc="-79" dirty="0" err="1">
-                <a:solidFill>
-                  <a:srgbClr val="3884FD"/>
-                </a:solidFill>
-                <a:latin typeface="Nunito Bold"/>
-              </a:rPr>
-              <a:t>solução</a:t>
-            </a:r>
-            <a:r>
-              <a:rPr lang="en-US" sz="7921" spc="-79" dirty="0">
-                <a:solidFill>
-                  <a:srgbClr val="3884FD"/>
-                </a:solidFill>
-                <a:latin typeface="Nunito Bold"/>
-              </a:rPr>
-              <a:t> de software</a:t>
+              <a:t>Diagrama de solução de software</a:t>
             </a:r>
           </a:p>
         </p:txBody>
@@ -6374,7 +6510,7 @@
         </p:nvSpPr>
         <p:spPr>
           <a:xfrm>
-            <a:off x="1028700" y="9258300"/>
+            <a:off x="952500" y="9639300"/>
             <a:ext cx="16230600" cy="0"/>
           </a:xfrm>
           <a:prstGeom prst="line">
@@ -6413,38 +6549,6 @@
           <a:prstGeom prst="rect">
             <a:avLst/>
           </a:prstGeom>
-        </p:spPr>
-      </p:pic>
-      <p:pic>
-        <p:nvPicPr>
-          <p:cNvPr id="5" name="Picture 5"/>
-          <p:cNvPicPr>
-            <a:picLocks noChangeAspect="1"/>
-          </p:cNvPicPr>
-          <p:nvPr/>
-        </p:nvPicPr>
-        <p:blipFill>
-          <a:blip r:embed="rId3"/>
-          <a:srcRect t="7109" b="7109"/>
-          <a:stretch>
-            <a:fillRect/>
-          </a:stretch>
-        </p:blipFill>
-        <p:spPr>
-          <a:xfrm>
-            <a:off x="3473017" y="1507338"/>
-            <a:ext cx="11341966" cy="7309117"/>
-          </a:xfrm>
-          <a:prstGeom prst="rect">
-            <a:avLst/>
-          </a:prstGeom>
-          <a:effectLst>
-            <a:outerShdw blurRad="63500" sx="102000" sy="102000" algn="ctr" rotWithShape="0">
-              <a:prstClr val="black">
-                <a:alpha val="40000"/>
-              </a:prstClr>
-            </a:outerShdw>
-          </a:effectLst>
         </p:spPr>
       </p:pic>
       <p:grpSp>
@@ -6530,6 +6634,49 @@
           </p:txBody>
         </p:sp>
       </p:grpSp>
+      <p:pic>
+        <p:nvPicPr>
+          <p:cNvPr id="10" name="Picture 9" descr="Diagram, schematic&#10;&#10;Description automatically generated">
+            <a:extLst>
+              <a:ext uri="{FF2B5EF4-FFF2-40B4-BE49-F238E27FC236}">
+                <a16:creationId xmlns:a16="http://schemas.microsoft.com/office/drawing/2014/main" id="{E1C35C48-6C69-465D-BF66-9D22671F8F9F}"/>
+              </a:ext>
+            </a:extLst>
+          </p:cNvPr>
+          <p:cNvPicPr>
+            <a:picLocks noChangeAspect="1"/>
+          </p:cNvPicPr>
+          <p:nvPr/>
+        </p:nvPicPr>
+        <p:blipFill>
+          <a:blip r:embed="rId3">
+            <a:extLst>
+              <a:ext uri="{28A0092B-C50C-407E-A947-70E740481C1C}">
+                <a14:useLocalDpi xmlns:a14="http://schemas.microsoft.com/office/drawing/2010/main" val="0"/>
+              </a:ext>
+            </a:extLst>
+          </a:blip>
+          <a:stretch>
+            <a:fillRect/>
+          </a:stretch>
+        </p:blipFill>
+        <p:spPr>
+          <a:xfrm>
+            <a:off x="3619500" y="1694629"/>
+            <a:ext cx="11468100" cy="7674054"/>
+          </a:xfrm>
+          <a:prstGeom prst="rect">
+            <a:avLst/>
+          </a:prstGeom>
+          <a:effectLst>
+            <a:outerShdw blurRad="50800" dist="38100" dir="10800000" algn="r" rotWithShape="0">
+              <a:prstClr val="black">
+                <a:alpha val="40000"/>
+              </a:prstClr>
+            </a:outerShdw>
+          </a:effectLst>
+        </p:spPr>
+      </p:pic>
     </p:spTree>
   </p:cSld>
   <p:clrMapOvr>
@@ -6575,7 +6722,7 @@
         </p:nvSpPr>
         <p:spPr>
           <a:xfrm>
-            <a:off x="870134" y="466725"/>
+            <a:off x="838200" y="435041"/>
             <a:ext cx="13903876" cy="1209675"/>
           </a:xfrm>
           <a:prstGeom prst="rect">
@@ -6594,7 +6741,7 @@
               </a:lnSpc>
             </a:pPr>
             <a:r>
-              <a:rPr lang="en-US" sz="8499" spc="-84">
+              <a:rPr lang="en-US" sz="8499" spc="-84" dirty="0">
                 <a:solidFill>
                   <a:srgbClr val="3884FD"/>
                 </a:solidFill>
@@ -6815,74 +6962,22 @@
           <a:chExt cx="0" cy="0"/>
         </a:xfrm>
       </p:grpSpPr>
-      <p:pic>
-        <p:nvPicPr>
-          <p:cNvPr id="2" name="Picture 2"/>
-          <p:cNvPicPr>
-            <a:picLocks noChangeAspect="1"/>
-          </p:cNvPicPr>
-          <p:nvPr/>
-        </p:nvPicPr>
-        <p:blipFill>
-          <a:blip r:embed="rId2">
+      <p:sp>
+        <p:nvSpPr>
+          <p:cNvPr id="2" name="TextBox 2">
             <a:extLst>
-              <a:ext uri="{28A0092B-C50C-407E-A947-70E740481C1C}">
-                <a14:useLocalDpi xmlns:a14="http://schemas.microsoft.com/office/drawing/2010/main" val="0"/>
-              </a:ext>
-              <a:ext uri="{96DAC541-7B7A-43D3-8B79-37D633B846F1}">
-                <asvg:svgBlip xmlns:asvg="http://schemas.microsoft.com/office/drawing/2016/SVG/main" r:embed="rId3"/>
+              <a:ext uri="{FF2B5EF4-FFF2-40B4-BE49-F238E27FC236}">
+                <a16:creationId xmlns:a16="http://schemas.microsoft.com/office/drawing/2014/main" id="{CF91143E-D21D-4FC8-8BA2-377D8352073C}"/>
               </a:ext>
             </a:extLst>
-          </a:blip>
-          <a:srcRect/>
-          <a:stretch>
-            <a:fillRect/>
-          </a:stretch>
-        </p:blipFill>
-        <p:spPr>
-          <a:xfrm>
-            <a:off x="9559658" y="2907033"/>
-            <a:ext cx="5993286" cy="6351267"/>
-          </a:xfrm>
-          <a:prstGeom prst="rect">
-            <a:avLst/>
-          </a:prstGeom>
-        </p:spPr>
-      </p:pic>
-      <p:sp>
-        <p:nvSpPr>
-          <p:cNvPr id="3" name="AutoShape 3"/>
-          <p:cNvSpPr/>
-          <p:nvPr/>
-        </p:nvSpPr>
-        <p:spPr>
-          <a:xfrm>
-            <a:off x="9640187" y="9258300"/>
-            <a:ext cx="5832227" cy="0"/>
-          </a:xfrm>
-          <a:prstGeom prst="line">
-            <a:avLst/>
-          </a:prstGeom>
-          <a:ln w="19050" cap="rnd">
-            <a:solidFill>
-              <a:srgbClr val="243762"/>
-            </a:solidFill>
-            <a:prstDash val="solid"/>
-            <a:headEnd type="none" w="sm" len="sm"/>
-            <a:tailEnd type="none" w="sm" len="sm"/>
-          </a:ln>
-        </p:spPr>
-      </p:sp>
-      <p:sp>
-        <p:nvSpPr>
-          <p:cNvPr id="4" name="TextBox 4"/>
+          </p:cNvPr>
           <p:cNvSpPr txBox="1"/>
           <p:nvPr/>
         </p:nvSpPr>
         <p:spPr>
           <a:xfrm>
-            <a:off x="1845629" y="1885895"/>
-            <a:ext cx="6281075" cy="1285875"/>
+            <a:off x="838200" y="435041"/>
+            <a:ext cx="13903876" cy="1209675"/>
           </a:xfrm>
           <a:prstGeom prst="rect">
             <a:avLst/>
@@ -6896,101 +6991,27 @@
           <a:p>
             <a:pPr>
               <a:lnSpc>
-                <a:spcPts val="9899"/>
+                <a:spcPts val="9349"/>
               </a:lnSpc>
             </a:pPr>
             <a:r>
-              <a:rPr lang="en-US" sz="8999" spc="-89">
+              <a:rPr lang="en-US" sz="8499" spc="-84" dirty="0">
                 <a:solidFill>
                   <a:srgbClr val="3884FD"/>
                 </a:solidFill>
                 <a:latin typeface="Nunito Bold"/>
               </a:rPr>
-              <a:t>Tela Swing</a:t>
-            </a:r>
-          </a:p>
-        </p:txBody>
-      </p:sp>
-      <p:sp>
-        <p:nvSpPr>
-          <p:cNvPr id="7" name="TextBox 7"/>
-          <p:cNvSpPr txBox="1"/>
-          <p:nvPr/>
-        </p:nvSpPr>
-        <p:spPr>
-          <a:xfrm>
-            <a:off x="15106427" y="1321448"/>
-            <a:ext cx="2597624" cy="167879"/>
-          </a:xfrm>
-          <a:prstGeom prst="rect">
-            <a:avLst/>
-          </a:prstGeom>
-        </p:spPr>
-        <p:txBody>
-          <a:bodyPr lIns="0" tIns="0" rIns="0" bIns="0" rtlCol="0" anchor="t">
-            <a:spAutoFit/>
-          </a:bodyPr>
-          <a:lstStyle/>
-          <a:p>
-            <a:pPr>
-              <a:lnSpc>
-                <a:spcPts val="1439"/>
-              </a:lnSpc>
-            </a:pPr>
-            <a:endParaRPr/>
-          </a:p>
-        </p:txBody>
-      </p:sp>
-      <p:sp>
-        <p:nvSpPr>
-          <p:cNvPr id="9" name="TextBox 6">
+              <a:t>Modelagem de dados</a:t>
+            </a:r>
+          </a:p>
+        </p:txBody>
+      </p:sp>
+      <p:pic>
+        <p:nvPicPr>
+          <p:cNvPr id="4" name="Picture 3">
             <a:extLst>
               <a:ext uri="{FF2B5EF4-FFF2-40B4-BE49-F238E27FC236}">
-                <a16:creationId xmlns:a16="http://schemas.microsoft.com/office/drawing/2014/main" id="{C34F50F5-5DA2-45DC-8CB7-B01F29C2B28F}"/>
-              </a:ext>
-            </a:extLst>
-          </p:cNvPr>
-          <p:cNvSpPr txBox="1"/>
-          <p:nvPr/>
-        </p:nvSpPr>
-        <p:spPr>
-          <a:xfrm>
-            <a:off x="15106427" y="592260"/>
-            <a:ext cx="2597624" cy="623026"/>
-          </a:xfrm>
-          <a:prstGeom prst="rect">
-            <a:avLst/>
-          </a:prstGeom>
-        </p:spPr>
-        <p:txBody>
-          <a:bodyPr lIns="0" tIns="0" rIns="0" bIns="0" rtlCol="0" anchor="t">
-            <a:spAutoFit/>
-          </a:bodyPr>
-          <a:lstStyle/>
-          <a:p>
-            <a:pPr>
-              <a:lnSpc>
-                <a:spcPts val="4737"/>
-              </a:lnSpc>
-            </a:pPr>
-            <a:r>
-              <a:rPr lang="en-US" sz="4307" spc="-43" dirty="0">
-                <a:solidFill>
-                  <a:srgbClr val="5879FA"/>
-                </a:solidFill>
-                <a:latin typeface="Nunito Bold"/>
-              </a:rPr>
-              <a:t>FastTech</a:t>
-            </a:r>
-          </a:p>
-        </p:txBody>
-      </p:sp>
-      <p:pic>
-        <p:nvPicPr>
-          <p:cNvPr id="10" name="Picture 3">
-            <a:extLst>
-              <a:ext uri="{FF2B5EF4-FFF2-40B4-BE49-F238E27FC236}">
-                <a16:creationId xmlns:a16="http://schemas.microsoft.com/office/drawing/2014/main" id="{71ECA046-3251-4AFF-8758-51DE7D98EC12}"/>
+                <a16:creationId xmlns:a16="http://schemas.microsoft.com/office/drawing/2014/main" id="{C722F9A4-FEB2-4F6B-B7F0-F2A0F4F2B692}"/>
               </a:ext>
             </a:extLst>
           </p:cNvPr>
@@ -7000,39 +7021,38 @@
           <p:nvPr/>
         </p:nvPicPr>
         <p:blipFill>
-          <a:blip r:embed="rId4"/>
-          <a:srcRect/>
+          <a:blip r:embed="rId2"/>
           <a:stretch>
             <a:fillRect/>
           </a:stretch>
         </p:blipFill>
         <p:spPr>
           <a:xfrm>
-            <a:off x="14115047" y="435041"/>
-            <a:ext cx="825172" cy="821093"/>
+            <a:off x="3161698" y="1866900"/>
+            <a:ext cx="11964604" cy="7589734"/>
           </a:xfrm>
           <a:prstGeom prst="rect">
             <a:avLst/>
           </a:prstGeom>
+          <a:effectLst>
+            <a:outerShdw blurRad="50800" dist="38100" dir="10800000" algn="r" rotWithShape="0">
+              <a:prstClr val="black">
+                <a:alpha val="40000"/>
+              </a:prstClr>
+            </a:outerShdw>
+          </a:effectLst>
         </p:spPr>
       </p:pic>
     </p:spTree>
+    <p:extLst>
+      <p:ext uri="{BB962C8B-B14F-4D97-AF65-F5344CB8AC3E}">
+        <p14:creationId xmlns:p14="http://schemas.microsoft.com/office/powerpoint/2010/main" val="542504373"/>
+      </p:ext>
+    </p:extLst>
   </p:cSld>
   <p:clrMapOvr>
     <a:masterClrMapping/>
   </p:clrMapOvr>
-  <mc:AlternateContent xmlns:mc="http://schemas.openxmlformats.org/markup-compatibility/2006" xmlns:p14="http://schemas.microsoft.com/office/powerpoint/2010/main">
-    <mc:Choice Requires="p14">
-      <p:transition spd="slow" p14:dur="1500">
-        <p:split orient="vert"/>
-      </p:transition>
-    </mc:Choice>
-    <mc:Fallback xmlns="">
-      <p:transition spd="slow">
-        <p:split orient="vert"/>
-      </p:transition>
-    </mc:Fallback>
-  </mc:AlternateContent>
 </p:sld>
 </file>
 
@@ -7053,16 +7073,74 @@
           <a:chExt cx="0" cy="0"/>
         </a:xfrm>
       </p:grpSpPr>
-      <p:sp>
-        <p:nvSpPr>
-          <p:cNvPr id="2" name="TextBox 2"/>
+      <p:pic>
+        <p:nvPicPr>
+          <p:cNvPr id="2" name="Picture 2"/>
+          <p:cNvPicPr>
+            <a:picLocks noChangeAspect="1"/>
+          </p:cNvPicPr>
+          <p:nvPr/>
+        </p:nvPicPr>
+        <p:blipFill>
+          <a:blip r:embed="rId2">
+            <a:extLst>
+              <a:ext uri="{28A0092B-C50C-407E-A947-70E740481C1C}">
+                <a14:useLocalDpi xmlns:a14="http://schemas.microsoft.com/office/drawing/2010/main" val="0"/>
+              </a:ext>
+              <a:ext uri="{96DAC541-7B7A-43D3-8B79-37D633B846F1}">
+                <asvg:svgBlip xmlns:asvg="http://schemas.microsoft.com/office/drawing/2016/SVG/main" r:embed="rId3"/>
+              </a:ext>
+            </a:extLst>
+          </a:blip>
+          <a:srcRect/>
+          <a:stretch>
+            <a:fillRect/>
+          </a:stretch>
+        </p:blipFill>
+        <p:spPr>
+          <a:xfrm>
+            <a:off x="9559658" y="2907033"/>
+            <a:ext cx="5993286" cy="6351267"/>
+          </a:xfrm>
+          <a:prstGeom prst="rect">
+            <a:avLst/>
+          </a:prstGeom>
+        </p:spPr>
+      </p:pic>
+      <p:sp>
+        <p:nvSpPr>
+          <p:cNvPr id="3" name="AutoShape 3"/>
+          <p:cNvSpPr/>
+          <p:nvPr/>
+        </p:nvSpPr>
+        <p:spPr>
+          <a:xfrm>
+            <a:off x="9640187" y="9258300"/>
+            <a:ext cx="5832227" cy="0"/>
+          </a:xfrm>
+          <a:prstGeom prst="line">
+            <a:avLst/>
+          </a:prstGeom>
+          <a:ln w="19050" cap="rnd">
+            <a:solidFill>
+              <a:srgbClr val="243762"/>
+            </a:solidFill>
+            <a:prstDash val="solid"/>
+            <a:headEnd type="none" w="sm" len="sm"/>
+            <a:tailEnd type="none" w="sm" len="sm"/>
+          </a:ln>
+        </p:spPr>
+      </p:sp>
+      <p:sp>
+        <p:nvSpPr>
+          <p:cNvPr id="4" name="TextBox 4"/>
           <p:cNvSpPr txBox="1"/>
           <p:nvPr/>
         </p:nvSpPr>
         <p:spPr>
           <a:xfrm>
-            <a:off x="1028700" y="1690626"/>
-            <a:ext cx="10981377" cy="2945425"/>
+            <a:off x="1845629" y="1885895"/>
+            <a:ext cx="6281075" cy="1285875"/>
           </a:xfrm>
           <a:prstGeom prst="rect">
             <a:avLst/>
@@ -7076,131 +7154,24 @@
           <a:p>
             <a:pPr>
               <a:lnSpc>
-                <a:spcPts val="11465"/>
+                <a:spcPts val="9899"/>
               </a:lnSpc>
             </a:pPr>
             <a:r>
-              <a:rPr lang="en-US" sz="10423" spc="-104">
+              <a:rPr lang="en-US" sz="8999" spc="-89">
                 <a:solidFill>
                   <a:srgbClr val="3884FD"/>
                 </a:solidFill>
                 <a:latin typeface="Nunito Bold"/>
               </a:rPr>
-              <a:t>Dashboard Estático</a:t>
-            </a:r>
-          </a:p>
-        </p:txBody>
-      </p:sp>
-      <p:grpSp>
-        <p:nvGrpSpPr>
-          <p:cNvPr id="3" name="Group 3"/>
-          <p:cNvGrpSpPr/>
-          <p:nvPr/>
-        </p:nvGrpSpPr>
-        <p:grpSpPr>
-          <a:xfrm>
-            <a:off x="8003817" y="4400854"/>
-            <a:ext cx="9217866" cy="4334932"/>
-            <a:chOff x="0" y="0"/>
-            <a:chExt cx="12290487" cy="5779909"/>
-          </a:xfrm>
-        </p:grpSpPr>
-        <p:pic>
-          <p:nvPicPr>
-            <p:cNvPr id="4" name="Picture 4"/>
-            <p:cNvPicPr>
-              <a:picLocks noChangeAspect="1"/>
-            </p:cNvPicPr>
-            <p:nvPr/>
-          </p:nvPicPr>
-          <p:blipFill>
-            <a:blip r:embed="rId2">
-              <a:extLst>
-                <a:ext uri="{28A0092B-C50C-407E-A947-70E740481C1C}">
-                  <a14:useLocalDpi xmlns:a14="http://schemas.microsoft.com/office/drawing/2010/main" val="0"/>
-                </a:ext>
-                <a:ext uri="{96DAC541-7B7A-43D3-8B79-37D633B846F1}">
-                  <asvg:svgBlip xmlns:asvg="http://schemas.microsoft.com/office/drawing/2016/SVG/main" r:embed="rId3"/>
-                </a:ext>
-              </a:extLst>
-            </a:blip>
-            <a:srcRect/>
-            <a:stretch>
-              <a:fillRect/>
-            </a:stretch>
-          </p:blipFill>
-          <p:spPr>
-            <a:xfrm>
-              <a:off x="598023" y="0"/>
-              <a:ext cx="5601257" cy="5779909"/>
-            </a:xfrm>
-            <a:prstGeom prst="rect">
-              <a:avLst/>
-            </a:prstGeom>
-          </p:spPr>
-        </p:pic>
-        <p:pic>
-          <p:nvPicPr>
-            <p:cNvPr id="5" name="Picture 5"/>
-            <p:cNvPicPr>
-              <a:picLocks noChangeAspect="1"/>
-            </p:cNvPicPr>
-            <p:nvPr/>
-          </p:nvPicPr>
-          <p:blipFill>
-            <a:blip r:embed="rId4">
-              <a:extLst>
-                <a:ext uri="{28A0092B-C50C-407E-A947-70E740481C1C}">
-                  <a14:useLocalDpi xmlns:a14="http://schemas.microsoft.com/office/drawing/2010/main" val="0"/>
-                </a:ext>
-                <a:ext uri="{96DAC541-7B7A-43D3-8B79-37D633B846F1}">
-                  <asvg:svgBlip xmlns:asvg="http://schemas.microsoft.com/office/drawing/2016/SVG/main" r:embed="rId5"/>
-                </a:ext>
-              </a:extLst>
-            </a:blip>
-            <a:srcRect/>
-            <a:stretch>
-              <a:fillRect/>
-            </a:stretch>
-          </p:blipFill>
-          <p:spPr>
-            <a:xfrm>
-              <a:off x="4661039" y="1594934"/>
-              <a:ext cx="5627716" cy="4184975"/>
-            </a:xfrm>
-            <a:prstGeom prst="rect">
-              <a:avLst/>
-            </a:prstGeom>
-          </p:spPr>
-        </p:pic>
-        <p:sp>
-          <p:nvSpPr>
-            <p:cNvPr id="6" name="AutoShape 6"/>
-            <p:cNvSpPr/>
-            <p:nvPr/>
-          </p:nvSpPr>
-          <p:spPr>
-            <a:xfrm>
-              <a:off x="0" y="5741346"/>
-              <a:ext cx="12290487" cy="0"/>
-            </a:xfrm>
-            <a:prstGeom prst="line">
-              <a:avLst/>
-            </a:prstGeom>
-            <a:ln w="30850" cap="rnd">
-              <a:solidFill>
-                <a:srgbClr val="243762"/>
-              </a:solidFill>
-              <a:prstDash val="solid"/>
-              <a:headEnd type="none" w="sm" len="sm"/>
-              <a:tailEnd type="none" w="sm" len="sm"/>
-            </a:ln>
-          </p:spPr>
-        </p:sp>
-      </p:grpSp>
-      <p:sp>
-        <p:nvSpPr>
-          <p:cNvPr id="9" name="TextBox 9"/>
+              <a:t>Tela Swing</a:t>
+            </a:r>
+          </a:p>
+        </p:txBody>
+      </p:sp>
+      <p:sp>
+        <p:nvSpPr>
+          <p:cNvPr id="7" name="TextBox 7"/>
           <p:cNvSpPr txBox="1"/>
           <p:nvPr/>
         </p:nvSpPr>
@@ -7228,43 +7199,12 @@
           </a:p>
         </p:txBody>
       </p:sp>
-      <p:pic>
-        <p:nvPicPr>
-          <p:cNvPr id="11" name="Picture 3">
+      <p:sp>
+        <p:nvSpPr>
+          <p:cNvPr id="9" name="TextBox 6">
             <a:extLst>
               <a:ext uri="{FF2B5EF4-FFF2-40B4-BE49-F238E27FC236}">
-                <a16:creationId xmlns:a16="http://schemas.microsoft.com/office/drawing/2014/main" id="{E62888E2-3A12-4624-8771-B34467BB82DE}"/>
-              </a:ext>
-            </a:extLst>
-          </p:cNvPr>
-          <p:cNvPicPr>
-            <a:picLocks noChangeAspect="1"/>
-          </p:cNvPicPr>
-          <p:nvPr/>
-        </p:nvPicPr>
-        <p:blipFill>
-          <a:blip r:embed="rId6"/>
-          <a:srcRect/>
-          <a:stretch>
-            <a:fillRect/>
-          </a:stretch>
-        </p:blipFill>
-        <p:spPr>
-          <a:xfrm>
-            <a:off x="14115047" y="369727"/>
-            <a:ext cx="825172" cy="821093"/>
-          </a:xfrm>
-          <a:prstGeom prst="rect">
-            <a:avLst/>
-          </a:prstGeom>
-        </p:spPr>
-      </p:pic>
-      <p:sp>
-        <p:nvSpPr>
-          <p:cNvPr id="12" name="TextBox 6">
-            <a:extLst>
-              <a:ext uri="{FF2B5EF4-FFF2-40B4-BE49-F238E27FC236}">
-                <a16:creationId xmlns:a16="http://schemas.microsoft.com/office/drawing/2014/main" id="{35BCBEB1-0228-406B-BAF5-5B5C0A037371}"/>
+                <a16:creationId xmlns:a16="http://schemas.microsoft.com/office/drawing/2014/main" id="{C34F50F5-5DA2-45DC-8CB7-B01F29C2B28F}"/>
               </a:ext>
             </a:extLst>
           </p:cNvPr>
@@ -7303,20 +7243,51 @@
           </a:p>
         </p:txBody>
       </p:sp>
+      <p:pic>
+        <p:nvPicPr>
+          <p:cNvPr id="10" name="Picture 3">
+            <a:extLst>
+              <a:ext uri="{FF2B5EF4-FFF2-40B4-BE49-F238E27FC236}">
+                <a16:creationId xmlns:a16="http://schemas.microsoft.com/office/drawing/2014/main" id="{71ECA046-3251-4AFF-8758-51DE7D98EC12}"/>
+              </a:ext>
+            </a:extLst>
+          </p:cNvPr>
+          <p:cNvPicPr>
+            <a:picLocks noChangeAspect="1"/>
+          </p:cNvPicPr>
+          <p:nvPr/>
+        </p:nvPicPr>
+        <p:blipFill>
+          <a:blip r:embed="rId4"/>
+          <a:srcRect/>
+          <a:stretch>
+            <a:fillRect/>
+          </a:stretch>
+        </p:blipFill>
+        <p:spPr>
+          <a:xfrm>
+            <a:off x="14115047" y="435041"/>
+            <a:ext cx="825172" cy="821093"/>
+          </a:xfrm>
+          <a:prstGeom prst="rect">
+            <a:avLst/>
+          </a:prstGeom>
+        </p:spPr>
+      </p:pic>
     </p:spTree>
   </p:cSld>
   <p:clrMapOvr>
     <a:masterClrMapping/>
   </p:clrMapOvr>
-  <mc:AlternateContent xmlns:mc="http://schemas.openxmlformats.org/markup-compatibility/2006" xmlns:p159="http://schemas.microsoft.com/office/powerpoint/2015/09/main">
-    <mc:Choice Requires="p159">
-      <p:transition xmlns:p14="http://schemas.microsoft.com/office/powerpoint/2010/main" spd="slow" p14:dur="2000">
-        <p159:morph option="byObject"/>
+  <mc:AlternateContent xmlns:mc="http://schemas.openxmlformats.org/markup-compatibility/2006" xmlns:p14="http://schemas.microsoft.com/office/powerpoint/2010/main">
+    <mc:Choice Requires="p14">
+      <p:transition spd="slow" p14:dur="1500">
+        <p:split orient="vert"/>
       </p:transition>
     </mc:Choice>
     <mc:Fallback xmlns="">
       <p:transition spd="slow">
-        <p:fade/>
+        <p:split orient="vert"/>
       </p:transition>
     </mc:Fallback>
   </mc:AlternateContent>

</xml_diff>